<commit_message>
dokumen & Tambah detail notebook
</commit_message>
<xml_diff>
--- a/Gender Classification/Project 1_v1.0.pptx
+++ b/Gender Classification/Project 1_v1.0.pptx
@@ -6636,7 +6636,7 @@
           <p:nvPr>
             <p:extLst>
               <p:ext uri="{D42A27DB-BD31-4B8C-83A1-F6EECF244321}">
-                <p14:modId xmlns:p14="http://schemas.microsoft.com/office/powerpoint/2010/main" val="374119406"/>
+                <p14:modId xmlns:p14="http://schemas.microsoft.com/office/powerpoint/2010/main" val="826265602"/>
               </p:ext>
             </p:extLst>
           </p:nvPr>
@@ -6681,10 +6681,14 @@
                     <a:lstStyle/>
                     <a:p>
                       <a:r>
-                        <a:rPr lang="en-US" sz="1800"/>
-                        <a:t>Hyperpararmeter Tuning</a:t>
+                        <a:rPr lang="en-US" sz="1800" dirty="0" err="1"/>
+                        <a:t>Hyperpararmeter</a:t>
                       </a:r>
-                      <a:endParaRPr lang="en-ID" sz="1800"/>
+                      <a:r>
+                        <a:rPr lang="en-US" sz="1800" dirty="0"/>
+                        <a:t> Tuning</a:t>
+                      </a:r>
+                      <a:endParaRPr lang="en-ID" sz="1800" dirty="0"/>
                     </a:p>
                   </a:txBody>
                   <a:tcPr/>
@@ -6730,10 +6734,10 @@
                     <a:lstStyle/>
                     <a:p>
                       <a:r>
-                        <a:rPr lang="en-US" sz="1800"/>
+                        <a:rPr lang="en-US" sz="1800" dirty="0"/>
                         <a:t>Optimizer</a:t>
                       </a:r>
-                      <a:endParaRPr lang="en-ID" sz="1800" b="0"/>
+                      <a:endParaRPr lang="en-ID" sz="1800" b="0" dirty="0"/>
                     </a:p>
                   </a:txBody>
                   <a:tcPr/>
@@ -6961,10 +6965,10 @@
                     <a:lstStyle/>
                     <a:p>
                       <a:r>
-                        <a:rPr lang="en-US" sz="1800"/>
-                        <a:t>VGG19 =20</a:t>
+                        <a:rPr lang="en-US" sz="1800" dirty="0"/>
+                        <a:t>VGG19 = 20</a:t>
                       </a:r>
-                      <a:endParaRPr lang="en-ID" sz="1800"/>
+                      <a:endParaRPr lang="en-ID" sz="1800" dirty="0"/>
                     </a:p>
                   </a:txBody>
                   <a:tcPr/>
@@ -7010,10 +7014,10 @@
                     <a:lstStyle/>
                     <a:p>
                       <a:r>
-                        <a:rPr lang="en-US" sz="1800"/>
+                        <a:rPr lang="en-US" sz="1800" dirty="0"/>
                         <a:t>-</a:t>
                       </a:r>
-                      <a:endParaRPr lang="en-ID" sz="1800"/>
+                      <a:endParaRPr lang="en-ID" sz="1800" dirty="0"/>
                     </a:p>
                   </a:txBody>
                   <a:tcPr/>
@@ -14177,8 +14181,8 @@
         </p:nvSpPr>
         <p:spPr>
           <a:xfrm>
-            <a:off x="1024295" y="5690415"/>
-            <a:ext cx="7793134" cy="369332"/>
+            <a:off x="1024294" y="5690415"/>
+            <a:ext cx="9687247" cy="369332"/>
           </a:xfrm>
           <a:prstGeom prst="rect">
             <a:avLst/>
@@ -14191,10 +14195,7 @@
           </a:bodyPr>
           <a:lstStyle/>
           <a:p>
-            <a:pPr marL="285750" indent="-285750" algn="just" rtl="0">
-              <a:spcBef>
-                <a:spcPts val="0"/>
-              </a:spcBef>
+            <a:pPr marL="285750" indent="-285750" algn="just">
               <a:spcAft>
                 <a:spcPts val="1200"/>
               </a:spcAft>
@@ -14202,13 +14203,14 @@
               <a:buChar char="§"/>
             </a:pPr>
             <a:r>
-              <a:rPr lang="en-ID" sz="1800" b="1" i="0" u="none" strike="noStrike">
-                <a:effectLst/>
-                <a:ea typeface="Open Sans" panose="020B0606030504020204" pitchFamily="34" charset="0"/>
-                <a:cs typeface="Open Sans" panose="020B0606030504020204" pitchFamily="34" charset="0"/>
-              </a:rPr>
-              <a:t>For this Project (Gender Classification) , We just using Atrbute Male</a:t>
-            </a:r>
+              <a:rPr lang="en-US" b="1" dirty="0"/>
+              <a:t>For this gender classification project, we are using the 'Male' attribute as the target.</a:t>
+            </a:r>
+            <a:endParaRPr lang="en-ID" sz="1800" b="1" i="0" u="none" strike="noStrike" dirty="0">
+              <a:effectLst/>
+              <a:ea typeface="Open Sans" panose="020B0606030504020204" pitchFamily="34" charset="0"/>
+              <a:cs typeface="Open Sans" panose="020B0606030504020204" pitchFamily="34" charset="0"/>
+            </a:endParaRPr>
           </a:p>
         </p:txBody>
       </p:sp>

</xml_diff>